<commit_message>
Lecture 10 PPT update and in-class files
</commit_message>
<xml_diff>
--- a/Lecture 9/lecture9.pptx
+++ b/Lecture 9/lecture9.pptx
@@ -178,7 +178,7 @@
   </p:defaultTextStyle>
   <p:extLst>
     <p:ext uri="{EFAFB233-063F-42B5-8137-9DF3F51BA10A}">
-      <p15:sldGuideLst xmlns:p15="http://schemas.microsoft.com/office/powerpoint/2012/main" xmlns="">
+      <p15:sldGuideLst xmlns="" xmlns:p15="http://schemas.microsoft.com/office/powerpoint/2012/main">
         <p15:guide id="1" orient="horz" pos="2160" userDrawn="1">
           <p15:clr>
             <a:srgbClr val="A4A3A4"/>
@@ -192,7 +192,7 @@
       </p15:sldGuideLst>
     </p:ext>
     <p:ext uri="{2D200454-40CA-4A62-9FC3-DE9A4176ACB9}">
-      <p15:notesGuideLst xmlns:p15="http://schemas.microsoft.com/office/powerpoint/2012/main" xmlns="">
+      <p15:notesGuideLst xmlns="" xmlns:p15="http://schemas.microsoft.com/office/powerpoint/2012/main">
         <p15:guide id="1" orient="horz" pos="2880">
           <p15:clr>
             <a:srgbClr val="A4A3A4"/>
@@ -292,7 +292,7 @@
             <a:fld id="{B4B40DF5-17F0-43C5-A7AE-65A758E8AB63}" type="datetimeFigureOut">
               <a:rPr lang="nl-NL" smtClean="0"/>
               <a:pPr/>
-              <a:t>4/7/21</a:t>
+              <a:t>4/14/21</a:t>
             </a:fld>
             <a:endParaRPr lang="nl-NL"/>
           </a:p>
@@ -458,7 +458,7 @@
           <a:p>
             <a:fld id="{A93D6BD4-2A44-460F-8349-CDAFC499EC45}" type="datetimeFigureOut">
               <a:rPr lang="en-US" smtClean="0"/>
-              <a:t>4/7/21</a:t>
+              <a:t>4/14/21</a:t>
             </a:fld>
             <a:endParaRPr lang="en-US"/>
           </a:p>
@@ -6312,14 +6312,14 @@
                 <a:gridCol w="2701636">
                   <a:extLst>
                     <a:ext uri="{9D8B030D-6E8A-4147-A177-3AD203B41FA5}">
-                      <a16:colId xmlns:a16="http://schemas.microsoft.com/office/drawing/2014/main" xmlns="" val="2625485568"/>
+                      <a16:colId xmlns="" xmlns:a16="http://schemas.microsoft.com/office/drawing/2014/main" val="2625485568"/>
                     </a:ext>
                   </a:extLst>
                 </a:gridCol>
                 <a:gridCol w="9490364">
                   <a:extLst>
                     <a:ext uri="{9D8B030D-6E8A-4147-A177-3AD203B41FA5}">
-                      <a16:colId xmlns:a16="http://schemas.microsoft.com/office/drawing/2014/main" xmlns="" val="1771793124"/>
+                      <a16:colId xmlns="" xmlns:a16="http://schemas.microsoft.com/office/drawing/2014/main" val="1771793124"/>
                     </a:ext>
                   </a:extLst>
                 </a:gridCol>
@@ -6395,7 +6395,7 @@
                 </a:tc>
                 <a:extLst>
                   <a:ext uri="{0D108BD9-81ED-4DB2-BD59-A6C34878D82A}">
-                    <a16:rowId xmlns:a16="http://schemas.microsoft.com/office/drawing/2014/main" xmlns="" val="1989477158"/>
+                    <a16:rowId xmlns="" xmlns:a16="http://schemas.microsoft.com/office/drawing/2014/main" val="1989477158"/>
                   </a:ext>
                 </a:extLst>
               </a:tr>
@@ -6493,7 +6493,7 @@
                 </a:tc>
                 <a:extLst>
                   <a:ext uri="{0D108BD9-81ED-4DB2-BD59-A6C34878D82A}">
-                    <a16:rowId xmlns:a16="http://schemas.microsoft.com/office/drawing/2014/main" xmlns="" val="1986205620"/>
+                    <a16:rowId xmlns="" xmlns:a16="http://schemas.microsoft.com/office/drawing/2014/main" val="1986205620"/>
                   </a:ext>
                 </a:extLst>
               </a:tr>
@@ -6591,7 +6591,7 @@
                 </a:tc>
                 <a:extLst>
                   <a:ext uri="{0D108BD9-81ED-4DB2-BD59-A6C34878D82A}">
-                    <a16:rowId xmlns:a16="http://schemas.microsoft.com/office/drawing/2014/main" xmlns="" val="4120191501"/>
+                    <a16:rowId xmlns="" xmlns:a16="http://schemas.microsoft.com/office/drawing/2014/main" val="4120191501"/>
                   </a:ext>
                 </a:extLst>
               </a:tr>
@@ -6793,7 +6793,7 @@
                 </a:tc>
                 <a:extLst>
                   <a:ext uri="{0D108BD9-81ED-4DB2-BD59-A6C34878D82A}">
-                    <a16:rowId xmlns:a16="http://schemas.microsoft.com/office/drawing/2014/main" xmlns="" val="1802813987"/>
+                    <a16:rowId xmlns="" xmlns:a16="http://schemas.microsoft.com/office/drawing/2014/main" val="1802813987"/>
                   </a:ext>
                 </a:extLst>
               </a:tr>
@@ -7899,14 +7899,14 @@
                 <a:gridCol w="2701636">
                   <a:extLst>
                     <a:ext uri="{9D8B030D-6E8A-4147-A177-3AD203B41FA5}">
-                      <a16:colId xmlns:a16="http://schemas.microsoft.com/office/drawing/2014/main" xmlns="" val="2625485568"/>
+                      <a16:colId xmlns="" xmlns:a16="http://schemas.microsoft.com/office/drawing/2014/main" val="2625485568"/>
                     </a:ext>
                   </a:extLst>
                 </a:gridCol>
                 <a:gridCol w="9490364">
                   <a:extLst>
                     <a:ext uri="{9D8B030D-6E8A-4147-A177-3AD203B41FA5}">
-                      <a16:colId xmlns:a16="http://schemas.microsoft.com/office/drawing/2014/main" xmlns="" val="1771793124"/>
+                      <a16:colId xmlns="" xmlns:a16="http://schemas.microsoft.com/office/drawing/2014/main" val="1771793124"/>
                     </a:ext>
                   </a:extLst>
                 </a:gridCol>
@@ -7982,7 +7982,7 @@
                 </a:tc>
                 <a:extLst>
                   <a:ext uri="{0D108BD9-81ED-4DB2-BD59-A6C34878D82A}">
-                    <a16:rowId xmlns:a16="http://schemas.microsoft.com/office/drawing/2014/main" xmlns="" val="1989477158"/>
+                    <a16:rowId xmlns="" xmlns:a16="http://schemas.microsoft.com/office/drawing/2014/main" val="1989477158"/>
                   </a:ext>
                 </a:extLst>
               </a:tr>
@@ -8091,7 +8091,7 @@
                 </a:tc>
                 <a:extLst>
                   <a:ext uri="{0D108BD9-81ED-4DB2-BD59-A6C34878D82A}">
-                    <a16:rowId xmlns:a16="http://schemas.microsoft.com/office/drawing/2014/main" xmlns="" val="1383210075"/>
+                    <a16:rowId xmlns="" xmlns:a16="http://schemas.microsoft.com/office/drawing/2014/main" val="1383210075"/>
                   </a:ext>
                 </a:extLst>
               </a:tr>
@@ -8208,7 +8208,7 @@
                 </a:tc>
                 <a:extLst>
                   <a:ext uri="{0D108BD9-81ED-4DB2-BD59-A6C34878D82A}">
-                    <a16:rowId xmlns:a16="http://schemas.microsoft.com/office/drawing/2014/main" xmlns="" val="1986205620"/>
+                    <a16:rowId xmlns="" xmlns:a16="http://schemas.microsoft.com/office/drawing/2014/main" val="1986205620"/>
                   </a:ext>
                 </a:extLst>
               </a:tr>
@@ -8306,7 +8306,7 @@
                 </a:tc>
                 <a:extLst>
                   <a:ext uri="{0D108BD9-81ED-4DB2-BD59-A6C34878D82A}">
-                    <a16:rowId xmlns:a16="http://schemas.microsoft.com/office/drawing/2014/main" xmlns="" val="4120191501"/>
+                    <a16:rowId xmlns="" xmlns:a16="http://schemas.microsoft.com/office/drawing/2014/main" val="4120191501"/>
                   </a:ext>
                 </a:extLst>
               </a:tr>
@@ -8404,7 +8404,7 @@
                 </a:tc>
                 <a:extLst>
                   <a:ext uri="{0D108BD9-81ED-4DB2-BD59-A6C34878D82A}">
-                    <a16:rowId xmlns:a16="http://schemas.microsoft.com/office/drawing/2014/main" xmlns="" val="1802813987"/>
+                    <a16:rowId xmlns="" xmlns:a16="http://schemas.microsoft.com/office/drawing/2014/main" val="1802813987"/>
                   </a:ext>
                 </a:extLst>
               </a:tr>
@@ -8515,7 +8515,7 @@
                 </a:tc>
                 <a:extLst>
                   <a:ext uri="{0D108BD9-81ED-4DB2-BD59-A6C34878D82A}">
-                    <a16:rowId xmlns:a16="http://schemas.microsoft.com/office/drawing/2014/main" xmlns="" val="182772178"/>
+                    <a16:rowId xmlns="" xmlns:a16="http://schemas.microsoft.com/office/drawing/2014/main" val="182772178"/>
                   </a:ext>
                 </a:extLst>
               </a:tr>
@@ -8633,7 +8633,7 @@
                 </a:tc>
                 <a:extLst>
                   <a:ext uri="{0D108BD9-81ED-4DB2-BD59-A6C34878D82A}">
-                    <a16:rowId xmlns:a16="http://schemas.microsoft.com/office/drawing/2014/main" xmlns="" val="3883455225"/>
+                    <a16:rowId xmlns="" xmlns:a16="http://schemas.microsoft.com/office/drawing/2014/main" val="3883455225"/>
                   </a:ext>
                 </a:extLst>
               </a:tr>
@@ -10149,14 +10149,14 @@
                 <a:gridCol w="2701636">
                   <a:extLst>
                     <a:ext uri="{9D8B030D-6E8A-4147-A177-3AD203B41FA5}">
-                      <a16:colId xmlns:a16="http://schemas.microsoft.com/office/drawing/2014/main" xmlns="" val="2625485568"/>
+                      <a16:colId xmlns="" xmlns:a16="http://schemas.microsoft.com/office/drawing/2014/main" val="2625485568"/>
                     </a:ext>
                   </a:extLst>
                 </a:gridCol>
                 <a:gridCol w="9490364">
                   <a:extLst>
                     <a:ext uri="{9D8B030D-6E8A-4147-A177-3AD203B41FA5}">
-                      <a16:colId xmlns:a16="http://schemas.microsoft.com/office/drawing/2014/main" xmlns="" val="1771793124"/>
+                      <a16:colId xmlns="" xmlns:a16="http://schemas.microsoft.com/office/drawing/2014/main" val="1771793124"/>
                     </a:ext>
                   </a:extLst>
                 </a:gridCol>
@@ -10232,7 +10232,7 @@
                 </a:tc>
                 <a:extLst>
                   <a:ext uri="{0D108BD9-81ED-4DB2-BD59-A6C34878D82A}">
-                    <a16:rowId xmlns:a16="http://schemas.microsoft.com/office/drawing/2014/main" xmlns="" val="1989477158"/>
+                    <a16:rowId xmlns="" xmlns:a16="http://schemas.microsoft.com/office/drawing/2014/main" val="1989477158"/>
                   </a:ext>
                 </a:extLst>
               </a:tr>
@@ -10341,7 +10341,7 @@
                 </a:tc>
                 <a:extLst>
                   <a:ext uri="{0D108BD9-81ED-4DB2-BD59-A6C34878D82A}">
-                    <a16:rowId xmlns:a16="http://schemas.microsoft.com/office/drawing/2014/main" xmlns="" val="1383210075"/>
+                    <a16:rowId xmlns="" xmlns:a16="http://schemas.microsoft.com/office/drawing/2014/main" val="1383210075"/>
                   </a:ext>
                 </a:extLst>
               </a:tr>
@@ -10439,7 +10439,7 @@
                 </a:tc>
                 <a:extLst>
                   <a:ext uri="{0D108BD9-81ED-4DB2-BD59-A6C34878D82A}">
-                    <a16:rowId xmlns:a16="http://schemas.microsoft.com/office/drawing/2014/main" xmlns="" val="1986205620"/>
+                    <a16:rowId xmlns="" xmlns:a16="http://schemas.microsoft.com/office/drawing/2014/main" val="1986205620"/>
                   </a:ext>
                 </a:extLst>
               </a:tr>
@@ -10537,7 +10537,7 @@
                 </a:tc>
                 <a:extLst>
                   <a:ext uri="{0D108BD9-81ED-4DB2-BD59-A6C34878D82A}">
-                    <a16:rowId xmlns:a16="http://schemas.microsoft.com/office/drawing/2014/main" xmlns="" val="4120191501"/>
+                    <a16:rowId xmlns="" xmlns:a16="http://schemas.microsoft.com/office/drawing/2014/main" val="4120191501"/>
                   </a:ext>
                 </a:extLst>
               </a:tr>
@@ -10635,7 +10635,7 @@
                 </a:tc>
                 <a:extLst>
                   <a:ext uri="{0D108BD9-81ED-4DB2-BD59-A6C34878D82A}">
-                    <a16:rowId xmlns:a16="http://schemas.microsoft.com/office/drawing/2014/main" xmlns="" val="1802813987"/>
+                    <a16:rowId xmlns="" xmlns:a16="http://schemas.microsoft.com/office/drawing/2014/main" val="1802813987"/>
                   </a:ext>
                 </a:extLst>
               </a:tr>
@@ -11082,10 +11082,6 @@
               </a:rPr>
               <a:t>[];</a:t>
             </a:r>
-            <a:endParaRPr lang="en-US" sz="1600" dirty="0" smtClean="0">
-              <a:latin typeface="Courier New" panose="02070309020205020404" pitchFamily="49" charset="0"/>
-              <a:cs typeface="Courier New" panose="02070309020205020404" pitchFamily="49" charset="0"/>
-            </a:endParaRPr>
           </a:p>
           <a:p>
             <a:pPr>
@@ -11936,14 +11932,14 @@
                 <a:gridCol w="2701636">
                   <a:extLst>
                     <a:ext uri="{9D8B030D-6E8A-4147-A177-3AD203B41FA5}">
-                      <a16:colId xmlns:a16="http://schemas.microsoft.com/office/drawing/2014/main" xmlns="" val="2625485568"/>
+                      <a16:colId xmlns="" xmlns:a16="http://schemas.microsoft.com/office/drawing/2014/main" val="2625485568"/>
                     </a:ext>
                   </a:extLst>
                 </a:gridCol>
                 <a:gridCol w="9490364">
                   <a:extLst>
                     <a:ext uri="{9D8B030D-6E8A-4147-A177-3AD203B41FA5}">
-                      <a16:colId xmlns:a16="http://schemas.microsoft.com/office/drawing/2014/main" xmlns="" val="1771793124"/>
+                      <a16:colId xmlns="" xmlns:a16="http://schemas.microsoft.com/office/drawing/2014/main" val="1771793124"/>
                     </a:ext>
                   </a:extLst>
                 </a:gridCol>
@@ -12019,7 +12015,7 @@
                 </a:tc>
                 <a:extLst>
                   <a:ext uri="{0D108BD9-81ED-4DB2-BD59-A6C34878D82A}">
-                    <a16:rowId xmlns:a16="http://schemas.microsoft.com/office/drawing/2014/main" xmlns="" val="1989477158"/>
+                    <a16:rowId xmlns="" xmlns:a16="http://schemas.microsoft.com/office/drawing/2014/main" val="1989477158"/>
                   </a:ext>
                 </a:extLst>
               </a:tr>
@@ -12117,7 +12113,7 @@
                 </a:tc>
                 <a:extLst>
                   <a:ext uri="{0D108BD9-81ED-4DB2-BD59-A6C34878D82A}">
-                    <a16:rowId xmlns:a16="http://schemas.microsoft.com/office/drawing/2014/main" xmlns="" val="1383210075"/>
+                    <a16:rowId xmlns="" xmlns:a16="http://schemas.microsoft.com/office/drawing/2014/main" val="1383210075"/>
                   </a:ext>
                 </a:extLst>
               </a:tr>
@@ -12203,7 +12199,7 @@
                 </a:tc>
                 <a:extLst>
                   <a:ext uri="{0D108BD9-81ED-4DB2-BD59-A6C34878D82A}">
-                    <a16:rowId xmlns:a16="http://schemas.microsoft.com/office/drawing/2014/main" xmlns="" val="1986205620"/>
+                    <a16:rowId xmlns="" xmlns:a16="http://schemas.microsoft.com/office/drawing/2014/main" val="1986205620"/>
                   </a:ext>
                 </a:extLst>
               </a:tr>
@@ -12301,7 +12297,7 @@
                 </a:tc>
                 <a:extLst>
                   <a:ext uri="{0D108BD9-81ED-4DB2-BD59-A6C34878D82A}">
-                    <a16:rowId xmlns:a16="http://schemas.microsoft.com/office/drawing/2014/main" xmlns="" val="4120191501"/>
+                    <a16:rowId xmlns="" xmlns:a16="http://schemas.microsoft.com/office/drawing/2014/main" val="4120191501"/>
                   </a:ext>
                 </a:extLst>
               </a:tr>
@@ -12399,7 +12395,7 @@
                 </a:tc>
                 <a:extLst>
                   <a:ext uri="{0D108BD9-81ED-4DB2-BD59-A6C34878D82A}">
-                    <a16:rowId xmlns:a16="http://schemas.microsoft.com/office/drawing/2014/main" xmlns="" val="1802813987"/>
+                    <a16:rowId xmlns="" xmlns:a16="http://schemas.microsoft.com/office/drawing/2014/main" val="1802813987"/>
                   </a:ext>
                 </a:extLst>
               </a:tr>
@@ -12525,7 +12521,7 @@
                 </a:tc>
                 <a:extLst>
                   <a:ext uri="{0D108BD9-81ED-4DB2-BD59-A6C34878D82A}">
-                    <a16:rowId xmlns:a16="http://schemas.microsoft.com/office/drawing/2014/main" xmlns="" val="1631875737"/>
+                    <a16:rowId xmlns="" xmlns:a16="http://schemas.microsoft.com/office/drawing/2014/main" val="1631875737"/>
                   </a:ext>
                 </a:extLst>
               </a:tr>
@@ -13817,14 +13813,14 @@
                 <a:gridCol w="1744980">
                   <a:extLst>
                     <a:ext uri="{9D8B030D-6E8A-4147-A177-3AD203B41FA5}">
-                      <a16:colId xmlns:a16="http://schemas.microsoft.com/office/drawing/2014/main" xmlns="" val="2625485568"/>
+                      <a16:colId xmlns="" xmlns:a16="http://schemas.microsoft.com/office/drawing/2014/main" val="2625485568"/>
                     </a:ext>
                   </a:extLst>
                 </a:gridCol>
                 <a:gridCol w="9490364">
                   <a:extLst>
                     <a:ext uri="{9D8B030D-6E8A-4147-A177-3AD203B41FA5}">
-                      <a16:colId xmlns:a16="http://schemas.microsoft.com/office/drawing/2014/main" xmlns="" val="1771793124"/>
+                      <a16:colId xmlns="" xmlns:a16="http://schemas.microsoft.com/office/drawing/2014/main" val="1771793124"/>
                     </a:ext>
                   </a:extLst>
                 </a:gridCol>
@@ -13900,7 +13896,7 @@
                 </a:tc>
                 <a:extLst>
                   <a:ext uri="{0D108BD9-81ED-4DB2-BD59-A6C34878D82A}">
-                    <a16:rowId xmlns:a16="http://schemas.microsoft.com/office/drawing/2014/main" xmlns="" val="1989477158"/>
+                    <a16:rowId xmlns="" xmlns:a16="http://schemas.microsoft.com/office/drawing/2014/main" val="1989477158"/>
                   </a:ext>
                 </a:extLst>
               </a:tr>
@@ -14013,7 +14009,7 @@
                 </a:tc>
                 <a:extLst>
                   <a:ext uri="{0D108BD9-81ED-4DB2-BD59-A6C34878D82A}">
-                    <a16:rowId xmlns:a16="http://schemas.microsoft.com/office/drawing/2014/main" xmlns="" val="1383210075"/>
+                    <a16:rowId xmlns="" xmlns:a16="http://schemas.microsoft.com/office/drawing/2014/main" val="1383210075"/>
                   </a:ext>
                 </a:extLst>
               </a:tr>
@@ -14130,7 +14126,7 @@
                 </a:tc>
                 <a:extLst>
                   <a:ext uri="{0D108BD9-81ED-4DB2-BD59-A6C34878D82A}">
-                    <a16:rowId xmlns:a16="http://schemas.microsoft.com/office/drawing/2014/main" xmlns="" val="1986205620"/>
+                    <a16:rowId xmlns="" xmlns:a16="http://schemas.microsoft.com/office/drawing/2014/main" val="1986205620"/>
                   </a:ext>
                 </a:extLst>
               </a:tr>
@@ -14228,7 +14224,7 @@
                 </a:tc>
                 <a:extLst>
                   <a:ext uri="{0D108BD9-81ED-4DB2-BD59-A6C34878D82A}">
-                    <a16:rowId xmlns:a16="http://schemas.microsoft.com/office/drawing/2014/main" xmlns="" val="4120191501"/>
+                    <a16:rowId xmlns="" xmlns:a16="http://schemas.microsoft.com/office/drawing/2014/main" val="4120191501"/>
                   </a:ext>
                 </a:extLst>
               </a:tr>
@@ -14303,7 +14299,7 @@
                 </a:tc>
                 <a:extLst>
                   <a:ext uri="{0D108BD9-81ED-4DB2-BD59-A6C34878D82A}">
-                    <a16:rowId xmlns:a16="http://schemas.microsoft.com/office/drawing/2014/main" xmlns="" val="841948195"/>
+                    <a16:rowId xmlns="" xmlns:a16="http://schemas.microsoft.com/office/drawing/2014/main" val="841948195"/>
                   </a:ext>
                 </a:extLst>
               </a:tr>
@@ -14378,7 +14374,7 @@
                 </a:tc>
                 <a:extLst>
                   <a:ext uri="{0D108BD9-81ED-4DB2-BD59-A6C34878D82A}">
-                    <a16:rowId xmlns:a16="http://schemas.microsoft.com/office/drawing/2014/main" xmlns="" val="1431232771"/>
+                    <a16:rowId xmlns="" xmlns:a16="http://schemas.microsoft.com/office/drawing/2014/main" val="1431232771"/>
                   </a:ext>
                 </a:extLst>
               </a:tr>
@@ -16489,6 +16485,27 @@
               </a:rPr>
               <a:t>Web storage is a new feature that lets the web site store and persist data on the user’s system. </a:t>
             </a:r>
+            <a:r>
+              <a:rPr lang="en-US" sz="1600" dirty="0" smtClean="0">
+                <a:solidFill>
+                  <a:schemeClr val="tx1"/>
+                </a:solidFill>
+              </a:rPr>
+              <a:t> </a:t>
+            </a:r>
+            <a:r>
+              <a:rPr lang="en-US" sz="1600" dirty="0" smtClean="0">
+                <a:solidFill>
+                  <a:srgbClr val="FFFF00"/>
+                </a:solidFill>
+              </a:rPr>
+              <a:t>Only way it will get lost if if you delete it or the user deletes their browser data.</a:t>
+            </a:r>
+            <a:endParaRPr lang="en-US" sz="1600" dirty="0">
+              <a:solidFill>
+                <a:srgbClr val="FFFF00"/>
+              </a:solidFill>
+            </a:endParaRPr>
           </a:p>
           <a:p>
             <a:pPr marL="342900" indent="-342900">

</xml_diff>